<commit_message>
Updating to remove designer comments and update group photo.
</commit_message>
<xml_diff>
--- a/LambdaTheExtreme.pptx
+++ b/LambdaTheExtreme.pptx
@@ -156,6 +156,77 @@
       </a:defRPr>
     </a:lvl9pPr>
   </p:defaultTextStyle>
+  <p:extLst>
+    <p:ext uri="{EFAFB233-063F-42B5-8137-9DF3F51BA10A}">
+      <p15:sldGuideLst xmlns:p15="http://schemas.microsoft.com/office/powerpoint/2012/main">
+        <p15:guide id="1" orient="horz" pos="3759">
+          <p15:clr>
+            <a:srgbClr val="A4A3A4"/>
+          </p15:clr>
+        </p15:guide>
+        <p15:guide id="2" orient="horz" pos="4067">
+          <p15:clr>
+            <a:srgbClr val="A4A3A4"/>
+          </p15:clr>
+        </p15:guide>
+        <p15:guide id="3" orient="horz" pos="950">
+          <p15:clr>
+            <a:srgbClr val="A4A3A4"/>
+          </p15:clr>
+        </p15:guide>
+        <p15:guide id="4" orient="horz" pos="591">
+          <p15:clr>
+            <a:srgbClr val="A4A3A4"/>
+          </p15:clr>
+        </p15:guide>
+        <p15:guide id="5" orient="horz" pos="287">
+          <p15:clr>
+            <a:srgbClr val="A4A3A4"/>
+          </p15:clr>
+        </p15:guide>
+        <p15:guide id="6" orient="horz" pos="3684">
+          <p15:clr>
+            <a:srgbClr val="A4A3A4"/>
+          </p15:clr>
+        </p15:guide>
+        <p15:guide id="7" orient="horz" pos="997">
+          <p15:clr>
+            <a:srgbClr val="A4A3A4"/>
+          </p15:clr>
+        </p15:guide>
+        <p15:guide id="8" orient="horz" pos="2073">
+          <p15:clr>
+            <a:srgbClr val="A4A3A4"/>
+          </p15:clr>
+        </p15:guide>
+        <p15:guide id="9" pos="2885">
+          <p15:clr>
+            <a:srgbClr val="A4A3A4"/>
+          </p15:clr>
+        </p15:guide>
+        <p15:guide id="10" pos="289">
+          <p15:clr>
+            <a:srgbClr val="A4A3A4"/>
+          </p15:clr>
+        </p15:guide>
+        <p15:guide id="11" pos="5481">
+          <p15:clr>
+            <a:srgbClr val="A4A3A4"/>
+          </p15:clr>
+        </p15:guide>
+        <p15:guide id="12" pos="431">
+          <p15:clr>
+            <a:srgbClr val="A4A3A4"/>
+          </p15:clr>
+        </p15:guide>
+        <p15:guide id="13" pos="588">
+          <p15:clr>
+            <a:srgbClr val="A4A3A4"/>
+          </p15:clr>
+        </p15:guide>
+      </p15:sldGuideLst>
+    </p:ext>
+  </p:extLst>
 </p:presentation>
 </file>
 
@@ -163,483 +234,6 @@
 <p:cmAuthorLst xmlns:a="http://schemas.openxmlformats.org/drawingml/2006/main" xmlns:r="http://schemas.openxmlformats.org/officeDocument/2006/relationships" xmlns:p="http://schemas.openxmlformats.org/presentationml/2006/main">
   <p:cmAuthor id="0" name="Terri Sharp" initials="TS" lastIdx="78" clrIdx="0"/>
 </p:cmAuthorLst>
-</file>
-
-<file path=ppt/comments/comment1.xml><?xml version="1.0" encoding="utf-8"?>
-<p:cmLst xmlns:a="http://schemas.openxmlformats.org/drawingml/2006/main" xmlns:r="http://schemas.openxmlformats.org/officeDocument/2006/relationships" xmlns:p="http://schemas.openxmlformats.org/presentationml/2006/main">
-  <p:cm authorId="0" dt="2014-06-18T13:40:32.758" idx="1">
-    <p:pos x="15" y="10"/>
-    <p:text>Background artwork, logo and address block are locked.
-Customize it: Unused text placeholders can be deleted if not needed. 
-The title placeholder will hold up to three lines of text, sub title holds up to two lines of text. For readability, it would be better not to change the size of the text on the title slides.</p:text>
-  </p:cm>
-</p:cmLst>
-</file>
-
-<file path=ppt/comments/comment10.xml><?xml version="1.0" encoding="utf-8"?>
-<p:cmLst xmlns:a="http://schemas.openxmlformats.org/drawingml/2006/main" xmlns:r="http://schemas.openxmlformats.org/officeDocument/2006/relationships" xmlns:p="http://schemas.openxmlformats.org/presentationml/2006/main">
-  <p:cm authorId="0" dt="2014-06-18T13:43:35.548" idx="39">
-    <p:pos x="27" y="-1"/>
-    <p:text>Customize it: Feel free to add an image or graphic to the right side of the box, if needed.</p:text>
-  </p:cm>
-</p:cmLst>
-</file>
-
-<file path=ppt/comments/comment11.xml><?xml version="1.0" encoding="utf-8"?>
-<p:cmLst xmlns:a="http://schemas.openxmlformats.org/drawingml/2006/main" xmlns:r="http://schemas.openxmlformats.org/officeDocument/2006/relationships" xmlns:p="http://schemas.openxmlformats.org/presentationml/2006/main">
-  <p:cm authorId="0" dt="2014-06-18T13:50:14.289" idx="41">
-    <p:pos x="1" y="1"/>
-    <p:text>Graphics placeholders can be moved, copied, resized and rearranged as needed to accommodate up to six images.
-Customize it: For a four-up layout, halve the height of the two boxes and copy/paste in duplicates to go below them.</p:text>
-  </p:cm>
-</p:cmLst>
-</file>
-
-<file path=ppt/comments/comment12.xml><?xml version="1.0" encoding="utf-8"?>
-<p:cmLst xmlns:a="http://schemas.openxmlformats.org/drawingml/2006/main" xmlns:r="http://schemas.openxmlformats.org/officeDocument/2006/relationships" xmlns:p="http://schemas.openxmlformats.org/presentationml/2006/main">
-  <p:cm authorId="0" dt="2014-06-18T13:43:35.548" idx="38">
-    <p:pos x="-3" y="5"/>
-    <p:text>Customize it: Feel free to add an image or graphic to the right side of the box, if needed.</p:text>
-  </p:cm>
-</p:cmLst>
-</file>
-
-<file path=ppt/comments/comment13.xml><?xml version="1.0" encoding="utf-8"?>
-<p:cmLst xmlns:a="http://schemas.openxmlformats.org/drawingml/2006/main" xmlns:r="http://schemas.openxmlformats.org/officeDocument/2006/relationships" xmlns:p="http://schemas.openxmlformats.org/presentationml/2006/main">
-  <p:cm authorId="0" dt="2014-06-18T13:50:14.289" idx="40">
-    <p:pos x="1" y="1"/>
-    <p:text>Graphics placeholders can be moved, copied, resized and rearranged as needed to accommodate up to six images.
-Customize it: For a four-up layout, halve the height of the two boxes and copy/paste in duplicates to go below them.</p:text>
-  </p:cm>
-</p:cmLst>
-</file>
-
-<file path=ppt/comments/comment14.xml><?xml version="1.0" encoding="utf-8"?>
-<p:cmLst xmlns:a="http://schemas.openxmlformats.org/drawingml/2006/main" xmlns:r="http://schemas.openxmlformats.org/officeDocument/2006/relationships" xmlns:p="http://schemas.openxmlformats.org/presentationml/2006/main">
-  <p:cm authorId="0" dt="2014-06-18T13:43:35.548" idx="42">
-    <p:pos x="27" y="-1"/>
-    <p:text>Customize it: Feel free to add an image or graphic to the right side of the box, if needed.</p:text>
-  </p:cm>
-</p:cmLst>
-</file>
-
-<file path=ppt/comments/comment15.xml><?xml version="1.0" encoding="utf-8"?>
-<p:cmLst xmlns:a="http://schemas.openxmlformats.org/drawingml/2006/main" xmlns:r="http://schemas.openxmlformats.org/officeDocument/2006/relationships" xmlns:p="http://schemas.openxmlformats.org/presentationml/2006/main">
-  <p:cm authorId="0" dt="2014-06-18T13:43:35.548" idx="44">
-    <p:pos x="-3" y="5"/>
-    <p:text>Customize it: Feel free to add an image or graphic to the right side of the box, if needed.</p:text>
-  </p:cm>
-</p:cmLst>
-</file>
-
-<file path=ppt/comments/comment16.xml><?xml version="1.0" encoding="utf-8"?>
-<p:cmLst xmlns:a="http://schemas.openxmlformats.org/drawingml/2006/main" xmlns:r="http://schemas.openxmlformats.org/officeDocument/2006/relationships" xmlns:p="http://schemas.openxmlformats.org/presentationml/2006/main">
-  <p:cm authorId="0" dt="2014-06-18T13:43:35.548" idx="45">
-    <p:pos x="-3" y="5"/>
-    <p:text>Customize it: Feel free to add an image or graphic to the right side of the box, if needed.</p:text>
-  </p:cm>
-</p:cmLst>
-</file>
-
-<file path=ppt/comments/comment17.xml><?xml version="1.0" encoding="utf-8"?>
-<p:cmLst xmlns:a="http://schemas.openxmlformats.org/drawingml/2006/main" xmlns:r="http://schemas.openxmlformats.org/officeDocument/2006/relationships" xmlns:p="http://schemas.openxmlformats.org/presentationml/2006/main">
-  <p:cm authorId="0" dt="2014-06-18T13:50:14.289" idx="43">
-    <p:pos x="1" y="1"/>
-    <p:text>Graphics placeholders can be moved, copied, resized and rearranged as needed to accommodate up to six images.
-Customize it: For a four-up layout, halve the height of the two boxes and copy/paste in duplicates to go below them.</p:text>
-  </p:cm>
-</p:cmLst>
-</file>
-
-<file path=ppt/comments/comment18.xml><?xml version="1.0" encoding="utf-8"?>
-<p:cmLst xmlns:a="http://schemas.openxmlformats.org/drawingml/2006/main" xmlns:r="http://schemas.openxmlformats.org/officeDocument/2006/relationships" xmlns:p="http://schemas.openxmlformats.org/presentationml/2006/main">
-  <p:cm authorId="0" dt="2014-06-18T13:43:35.548" idx="28">
-    <p:pos x="-3" y="5"/>
-    <p:text>Customize it: Feel free to add an image or graphic to the right side of the box, if needed.</p:text>
-  </p:cm>
-</p:cmLst>
-</file>
-
-<file path=ppt/comments/comment19.xml><?xml version="1.0" encoding="utf-8"?>
-<p:cmLst xmlns:a="http://schemas.openxmlformats.org/drawingml/2006/main" xmlns:r="http://schemas.openxmlformats.org/officeDocument/2006/relationships" xmlns:p="http://schemas.openxmlformats.org/presentationml/2006/main">
-  <p:cm authorId="0" dt="2014-06-18T13:50:14.289" idx="46">
-    <p:pos x="1" y="1"/>
-    <p:text>Graphics placeholders can be moved, copied, resized and rearranged as needed to accommodate up to six images.
-Customize it: For a four-up layout, halve the height of the two boxes and copy/paste in duplicates to go below them.</p:text>
-  </p:cm>
-</p:cmLst>
-</file>
-
-<file path=ppt/comments/comment2.xml><?xml version="1.0" encoding="utf-8"?>
-<p:cmLst xmlns:a="http://schemas.openxmlformats.org/drawingml/2006/main" xmlns:r="http://schemas.openxmlformats.org/officeDocument/2006/relationships" xmlns:p="http://schemas.openxmlformats.org/presentationml/2006/main">
-  <p:cm authorId="0" dt="2014-07-09T17:59:10.629" idx="23">
-    <p:pos x="40" y="22"/>
-    <p:text>The bullet text follows the same formatting as the other text placeholders.
-Customize it: The grid placeholders can be deleted, resized and moved as needed, they don't have to all be used. Widen the space between them to add captions above or below. Reduce the width of the text box to accommodate more images.</p:text>
-  </p:cm>
-</p:cmLst>
-</file>
-
-<file path=ppt/comments/comment20.xml><?xml version="1.0" encoding="utf-8"?>
-<p:cmLst xmlns:a="http://schemas.openxmlformats.org/drawingml/2006/main" xmlns:r="http://schemas.openxmlformats.org/officeDocument/2006/relationships" xmlns:p="http://schemas.openxmlformats.org/presentationml/2006/main">
-  <p:cm authorId="0" dt="2014-06-18T13:50:14.289" idx="47">
-    <p:pos x="1" y="1"/>
-    <p:text>Graphics placeholders can be moved, copied, resized and rearranged as needed to accommodate up to six images.
-Customize it: For a four-up layout, halve the height of the two boxes and copy/paste in duplicates to go below them.</p:text>
-  </p:cm>
-</p:cmLst>
-</file>
-
-<file path=ppt/comments/comment21.xml><?xml version="1.0" encoding="utf-8"?>
-<p:cmLst xmlns:a="http://schemas.openxmlformats.org/drawingml/2006/main" xmlns:r="http://schemas.openxmlformats.org/officeDocument/2006/relationships" xmlns:p="http://schemas.openxmlformats.org/presentationml/2006/main">
-  <p:cm authorId="0" dt="2014-06-18T13:43:35.548" idx="48">
-    <p:pos x="27" y="-1"/>
-    <p:text>Customize it: Feel free to add an image or graphic to the right side of the box, if needed.</p:text>
-  </p:cm>
-</p:cmLst>
-</file>
-
-<file path=ppt/comments/comment22.xml><?xml version="1.0" encoding="utf-8"?>
-<p:cmLst xmlns:a="http://schemas.openxmlformats.org/drawingml/2006/main" xmlns:r="http://schemas.openxmlformats.org/officeDocument/2006/relationships" xmlns:p="http://schemas.openxmlformats.org/presentationml/2006/main">
-  <p:cm authorId="0" dt="2014-06-18T13:50:14.289" idx="51">
-    <p:pos x="1" y="1"/>
-    <p:text>Graphics placeholders can be moved, copied, resized and rearranged as needed to accommodate up to six images.
-Customize it: For a four-up layout, halve the height of the two boxes and copy/paste in duplicates to go below them.</p:text>
-  </p:cm>
-</p:cmLst>
-</file>
-
-<file path=ppt/comments/comment23.xml><?xml version="1.0" encoding="utf-8"?>
-<p:cmLst xmlns:a="http://schemas.openxmlformats.org/drawingml/2006/main" xmlns:r="http://schemas.openxmlformats.org/officeDocument/2006/relationships" xmlns:p="http://schemas.openxmlformats.org/presentationml/2006/main">
-  <p:cm authorId="0" dt="2014-06-18T13:50:14.289" idx="52">
-    <p:pos x="1" y="1"/>
-    <p:text>Graphics placeholders can be moved, copied, resized and rearranged as needed to accommodate up to six images.
-Customize it: For a four-up layout, halve the height of the two boxes and copy/paste in duplicates to go below them.</p:text>
-  </p:cm>
-</p:cmLst>
-</file>
-
-<file path=ppt/comments/comment24.xml><?xml version="1.0" encoding="utf-8"?>
-<p:cmLst xmlns:a="http://schemas.openxmlformats.org/drawingml/2006/main" xmlns:r="http://schemas.openxmlformats.org/officeDocument/2006/relationships" xmlns:p="http://schemas.openxmlformats.org/presentationml/2006/main">
-  <p:cm authorId="0" dt="2014-06-18T13:43:35.548" idx="49">
-    <p:pos x="-3" y="5"/>
-    <p:text>Customize it: Feel free to add an image or graphic to the right side of the box, if needed.</p:text>
-  </p:cm>
-</p:cmLst>
-</file>
-
-<file path=ppt/comments/comment25.xml><?xml version="1.0" encoding="utf-8"?>
-<p:cmLst xmlns:a="http://schemas.openxmlformats.org/drawingml/2006/main" xmlns:r="http://schemas.openxmlformats.org/officeDocument/2006/relationships" xmlns:p="http://schemas.openxmlformats.org/presentationml/2006/main">
-  <p:cm authorId="0" dt="2014-06-18T13:43:35.548" idx="50">
-    <p:pos x="-3" y="5"/>
-    <p:text>Customize it: Feel free to add an image or graphic to the right side of the box, if needed.</p:text>
-  </p:cm>
-</p:cmLst>
-</file>
-
-<file path=ppt/comments/comment26.xml><?xml version="1.0" encoding="utf-8"?>
-<p:cmLst xmlns:a="http://schemas.openxmlformats.org/drawingml/2006/main" xmlns:r="http://schemas.openxmlformats.org/officeDocument/2006/relationships" xmlns:p="http://schemas.openxmlformats.org/presentationml/2006/main">
-  <p:cm authorId="0" dt="2014-06-18T13:43:35.548" idx="55">
-    <p:pos x="-3" y="5"/>
-    <p:text>Customize it: Feel free to add an image or graphic to the right side of the box, if needed.</p:text>
-  </p:cm>
-</p:cmLst>
-</file>
-
-<file path=ppt/comments/comment27.xml><?xml version="1.0" encoding="utf-8"?>
-<p:cmLst xmlns:a="http://schemas.openxmlformats.org/drawingml/2006/main" xmlns:r="http://schemas.openxmlformats.org/officeDocument/2006/relationships" xmlns:p="http://schemas.openxmlformats.org/presentationml/2006/main">
-  <p:cm authorId="0" dt="2014-06-18T13:50:14.289" idx="58">
-    <p:pos x="1" y="1"/>
-    <p:text>Graphics placeholders can be moved, copied, resized and rearranged as needed to accommodate up to six images.
-Customize it: For a four-up layout, halve the height of the two boxes and copy/paste in duplicates to go below them.</p:text>
-  </p:cm>
-</p:cmLst>
-</file>
-
-<file path=ppt/comments/comment28.xml><?xml version="1.0" encoding="utf-8"?>
-<p:cmLst xmlns:a="http://schemas.openxmlformats.org/drawingml/2006/main" xmlns:r="http://schemas.openxmlformats.org/officeDocument/2006/relationships" xmlns:p="http://schemas.openxmlformats.org/presentationml/2006/main">
-  <p:cm authorId="0" dt="2014-06-18T13:50:14.289" idx="59">
-    <p:pos x="1" y="1"/>
-    <p:text>Graphics placeholders can be moved, copied, resized and rearranged as needed to accommodate up to six images.
-Customize it: For a four-up layout, halve the height of the two boxes and copy/paste in duplicates to go below them.</p:text>
-  </p:cm>
-</p:cmLst>
-</file>
-
-<file path=ppt/comments/comment29.xml><?xml version="1.0" encoding="utf-8"?>
-<p:cmLst xmlns:a="http://schemas.openxmlformats.org/drawingml/2006/main" xmlns:r="http://schemas.openxmlformats.org/officeDocument/2006/relationships" xmlns:p="http://schemas.openxmlformats.org/presentationml/2006/main">
-  <p:cm authorId="0" dt="2014-06-18T13:43:35.548" idx="75">
-    <p:pos x="27" y="-1"/>
-    <p:text>Customize it: Feel free to add an image or graphic to the right side of the box, if needed.</p:text>
-  </p:cm>
-</p:cmLst>
-</file>
-
-<file path=ppt/comments/comment3.xml><?xml version="1.0" encoding="utf-8"?>
-<p:cmLst xmlns:a="http://schemas.openxmlformats.org/drawingml/2006/main" xmlns:r="http://schemas.openxmlformats.org/officeDocument/2006/relationships" xmlns:p="http://schemas.openxmlformats.org/presentationml/2006/main">
-  <p:cm authorId="0" dt="2014-06-18T13:42:07.881" idx="3">
-    <p:pos x="1" y="0"/>
-    <p:text>The gray background box is locked. A blank version (no gray box) is available if needed.
-Customize it: Move the quote marks to fit around your text. The text placeholder can be changed as needed, if you wish to use smaller text and add an image or graphic. </p:text>
-  </p:cm>
-</p:cmLst>
-</file>
-
-<file path=ppt/comments/comment30.xml><?xml version="1.0" encoding="utf-8"?>
-<p:cmLst xmlns:a="http://schemas.openxmlformats.org/drawingml/2006/main" xmlns:r="http://schemas.openxmlformats.org/officeDocument/2006/relationships" xmlns:p="http://schemas.openxmlformats.org/presentationml/2006/main">
-  <p:cm authorId="0" dt="2014-06-18T13:43:35.548" idx="65">
-    <p:pos x="-3" y="5"/>
-    <p:text>Customize it: Feel free to add an image or graphic to the right side of the box, if needed.</p:text>
-  </p:cm>
-</p:cmLst>
-</file>
-
-<file path=ppt/comments/comment31.xml><?xml version="1.0" encoding="utf-8"?>
-<p:cmLst xmlns:a="http://schemas.openxmlformats.org/drawingml/2006/main" xmlns:r="http://schemas.openxmlformats.org/officeDocument/2006/relationships" xmlns:p="http://schemas.openxmlformats.org/presentationml/2006/main">
-  <p:cm authorId="0" dt="2014-06-18T13:43:35.548" idx="60">
-    <p:pos x="-3" y="5"/>
-    <p:text>Customize it: Feel free to add an image or graphic to the right side of the box, if needed.</p:text>
-  </p:cm>
-</p:cmLst>
-</file>
-
-<file path=ppt/comments/comment32.xml><?xml version="1.0" encoding="utf-8"?>
-<p:cmLst xmlns:a="http://schemas.openxmlformats.org/drawingml/2006/main" xmlns:r="http://schemas.openxmlformats.org/officeDocument/2006/relationships" xmlns:p="http://schemas.openxmlformats.org/presentationml/2006/main">
-  <p:cm authorId="0" dt="2014-06-18T13:43:35.548" idx="30">
-    <p:pos x="-3" y="5"/>
-    <p:text>Customize it: Feel free to add an image or graphic to the right side of the box, if needed.</p:text>
-  </p:cm>
-</p:cmLst>
-</file>
-
-<file path=ppt/comments/comment33.xml><?xml version="1.0" encoding="utf-8"?>
-<p:cmLst xmlns:a="http://schemas.openxmlformats.org/drawingml/2006/main" xmlns:r="http://schemas.openxmlformats.org/officeDocument/2006/relationships" xmlns:p="http://schemas.openxmlformats.org/presentationml/2006/main">
-  <p:cm authorId="0" dt="2014-06-18T13:50:14.289" idx="61">
-    <p:pos x="1" y="1"/>
-    <p:text>Graphics placeholders can be moved, copied, resized and rearranged as needed to accommodate up to six images.
-Customize it: For a four-up layout, halve the height of the two boxes and copy/paste in duplicates to go below them.</p:text>
-  </p:cm>
-</p:cmLst>
-</file>
-
-<file path=ppt/comments/comment34.xml><?xml version="1.0" encoding="utf-8"?>
-<p:cmLst xmlns:a="http://schemas.openxmlformats.org/drawingml/2006/main" xmlns:r="http://schemas.openxmlformats.org/officeDocument/2006/relationships" xmlns:p="http://schemas.openxmlformats.org/presentationml/2006/main">
-  <p:cm authorId="0" dt="2014-06-18T13:50:14.289" idx="63">
-    <p:pos x="1" y="1"/>
-    <p:text>Graphics placeholders can be moved, copied, resized and rearranged as needed to accommodate up to six images.
-Customize it: For a four-up layout, halve the height of the two boxes and copy/paste in duplicates to go below them.</p:text>
-  </p:cm>
-</p:cmLst>
-</file>
-
-<file path=ppt/comments/comment35.xml><?xml version="1.0" encoding="utf-8"?>
-<p:cmLst xmlns:a="http://schemas.openxmlformats.org/drawingml/2006/main" xmlns:r="http://schemas.openxmlformats.org/officeDocument/2006/relationships" xmlns:p="http://schemas.openxmlformats.org/presentationml/2006/main">
-  <p:cm authorId="0" dt="2014-06-18T13:50:14.289" idx="66">
-    <p:pos x="1" y="1"/>
-    <p:text>Graphics placeholders can be moved, copied, resized and rearranged as needed to accommodate up to six images.
-Customize it: For a four-up layout, halve the height of the two boxes and copy/paste in duplicates to go below them.</p:text>
-  </p:cm>
-</p:cmLst>
-</file>
-
-<file path=ppt/comments/comment36.xml><?xml version="1.0" encoding="utf-8"?>
-<p:cmLst xmlns:a="http://schemas.openxmlformats.org/drawingml/2006/main" xmlns:r="http://schemas.openxmlformats.org/officeDocument/2006/relationships" xmlns:p="http://schemas.openxmlformats.org/presentationml/2006/main">
-  <p:cm authorId="0" dt="2014-06-18T13:43:35.548" idx="76">
-    <p:pos x="27" y="-1"/>
-    <p:text>Customize it: Feel free to add an image or graphic to the right side of the box, if needed.</p:text>
-  </p:cm>
-</p:cmLst>
-</file>
-
-<file path=ppt/comments/comment37.xml><?xml version="1.0" encoding="utf-8"?>
-<p:cmLst xmlns:a="http://schemas.openxmlformats.org/drawingml/2006/main" xmlns:r="http://schemas.openxmlformats.org/officeDocument/2006/relationships" xmlns:p="http://schemas.openxmlformats.org/presentationml/2006/main">
-  <p:cm authorId="0" dt="2014-06-18T13:43:35.548" idx="64">
-    <p:pos x="-3" y="5"/>
-    <p:text>Customize it: Feel free to add an image or graphic to the right side of the box, if needed.</p:text>
-  </p:cm>
-</p:cmLst>
-</file>
-
-<file path=ppt/comments/comment38.xml><?xml version="1.0" encoding="utf-8"?>
-<p:cmLst xmlns:a="http://schemas.openxmlformats.org/drawingml/2006/main" xmlns:r="http://schemas.openxmlformats.org/officeDocument/2006/relationships" xmlns:p="http://schemas.openxmlformats.org/presentationml/2006/main">
-  <p:cm authorId="0" dt="2014-06-18T13:50:14.289" idx="67">
-    <p:pos x="1" y="1"/>
-    <p:text>Graphics placeholders can be moved, copied, resized and rearranged as needed to accommodate up to six images.
-Customize it: For a four-up layout, halve the height of the two boxes and copy/paste in duplicates to go below them.</p:text>
-  </p:cm>
-</p:cmLst>
-</file>
-
-<file path=ppt/comments/comment39.xml><?xml version="1.0" encoding="utf-8"?>
-<p:cmLst xmlns:a="http://schemas.openxmlformats.org/drawingml/2006/main" xmlns:r="http://schemas.openxmlformats.org/officeDocument/2006/relationships" xmlns:p="http://schemas.openxmlformats.org/presentationml/2006/main">
-  <p:cm authorId="0" dt="2014-06-18T13:50:14.289" idx="68">
-    <p:pos x="1" y="1"/>
-    <p:text>Graphics placeholders can be moved, copied, resized and rearranged as needed to accommodate up to six images.
-Customize it: For a four-up layout, halve the height of the two boxes and copy/paste in duplicates to go below them.</p:text>
-  </p:cm>
-</p:cmLst>
-</file>
-
-<file path=ppt/comments/comment4.xml><?xml version="1.0" encoding="utf-8"?>
-<p:cmLst xmlns:a="http://schemas.openxmlformats.org/drawingml/2006/main" xmlns:r="http://schemas.openxmlformats.org/officeDocument/2006/relationships" xmlns:p="http://schemas.openxmlformats.org/presentationml/2006/main">
-  <p:cm authorId="0" dt="2014-06-18T13:43:08.250" idx="4">
-    <p:pos x="19" y="-11"/>
-    <p:text>The Agenda layout is a specially formatted bullet-type layout. Red title text is level one; use Increase List Level (NOT the Bullet List button) to move to level two formatting for listing agenda or schedule items.
-Customize it: Add sublists to agenda lines using the bulleted list formatting built in - use the Increase List Level button to access the additional formatting.</p:text>
-  </p:cm>
-</p:cmLst>
-</file>
-
-<file path=ppt/comments/comment40.xml><?xml version="1.0" encoding="utf-8"?>
-<p:cmLst xmlns:a="http://schemas.openxmlformats.org/drawingml/2006/main" xmlns:r="http://schemas.openxmlformats.org/officeDocument/2006/relationships" xmlns:p="http://schemas.openxmlformats.org/presentationml/2006/main">
-  <p:cm authorId="0" dt="2014-06-18T13:43:35.548" idx="69">
-    <p:pos x="-3" y="5"/>
-    <p:text>Customize it: Feel free to add an image or graphic to the right side of the box, if needed.</p:text>
-  </p:cm>
-</p:cmLst>
-</file>
-
-<file path=ppt/comments/comment41.xml><?xml version="1.0" encoding="utf-8"?>
-<p:cmLst xmlns:a="http://schemas.openxmlformats.org/drawingml/2006/main" xmlns:r="http://schemas.openxmlformats.org/officeDocument/2006/relationships" xmlns:p="http://schemas.openxmlformats.org/presentationml/2006/main">
-  <p:cm authorId="0" dt="2014-06-18T13:43:35.548" idx="54">
-    <p:pos x="-3" y="5"/>
-    <p:text>Customize it: Feel free to add an image or graphic to the right side of the box, if needed.</p:text>
-  </p:cm>
-</p:cmLst>
-</file>
-
-<file path=ppt/comments/comment42.xml><?xml version="1.0" encoding="utf-8"?>
-<p:cmLst xmlns:a="http://schemas.openxmlformats.org/drawingml/2006/main" xmlns:r="http://schemas.openxmlformats.org/officeDocument/2006/relationships" xmlns:p="http://schemas.openxmlformats.org/presentationml/2006/main">
-  <p:cm authorId="0" dt="2014-06-18T13:50:14.289" idx="70">
-    <p:pos x="1" y="1"/>
-    <p:text>Graphics placeholders can be moved, copied, resized and rearranged as needed to accommodate up to six images.
-Customize it: For a four-up layout, halve the height of the two boxes and copy/paste in duplicates to go below them.</p:text>
-  </p:cm>
-</p:cmLst>
-</file>
-
-<file path=ppt/comments/comment43.xml><?xml version="1.0" encoding="utf-8"?>
-<p:cmLst xmlns:a="http://schemas.openxmlformats.org/drawingml/2006/main" xmlns:r="http://schemas.openxmlformats.org/officeDocument/2006/relationships" xmlns:p="http://schemas.openxmlformats.org/presentationml/2006/main">
-  <p:cm authorId="0" dt="2014-06-18T13:50:14.289" idx="71">
-    <p:pos x="1" y="1"/>
-    <p:text>Graphics placeholders can be moved, copied, resized and rearranged as needed to accommodate up to six images.
-Customize it: For a four-up layout, halve the height of the two boxes and copy/paste in duplicates to go below them.</p:text>
-  </p:cm>
-</p:cmLst>
-</file>
-
-<file path=ppt/comments/comment44.xml><?xml version="1.0" encoding="utf-8"?>
-<p:cmLst xmlns:a="http://schemas.openxmlformats.org/drawingml/2006/main" xmlns:r="http://schemas.openxmlformats.org/officeDocument/2006/relationships" xmlns:p="http://schemas.openxmlformats.org/presentationml/2006/main">
-  <p:cm authorId="0" dt="2014-06-18T13:43:35.548" idx="77">
-    <p:pos x="27" y="-1"/>
-    <p:text>Customize it: Feel free to add an image or graphic to the right side of the box, if needed.</p:text>
-  </p:cm>
-</p:cmLst>
-</file>
-
-<file path=ppt/comments/comment45.xml><?xml version="1.0" encoding="utf-8"?>
-<p:cmLst xmlns:a="http://schemas.openxmlformats.org/drawingml/2006/main" xmlns:r="http://schemas.openxmlformats.org/officeDocument/2006/relationships" xmlns:p="http://schemas.openxmlformats.org/presentationml/2006/main">
-  <p:cm authorId="0" dt="2014-06-18T13:43:35.548" idx="78">
-    <p:pos x="-3" y="5"/>
-    <p:text>Customize it: Feel free to add an image or graphic to the right side of the box, if needed.</p:text>
-  </p:cm>
-</p:cmLst>
-</file>
-
-<file path=ppt/comments/comment46.xml><?xml version="1.0" encoding="utf-8"?>
-<p:cmLst xmlns:a="http://schemas.openxmlformats.org/drawingml/2006/main" xmlns:r="http://schemas.openxmlformats.org/officeDocument/2006/relationships" xmlns:p="http://schemas.openxmlformats.org/presentationml/2006/main">
-  <p:cm authorId="0" dt="2014-06-18T13:50:14.289" idx="72">
-    <p:pos x="1" y="1"/>
-    <p:text>Graphics placeholders can be moved, copied, resized and rearranged as needed to accommodate up to six images.
-Customize it: For a four-up layout, halve the height of the two boxes and copy/paste in duplicates to go below them.</p:text>
-  </p:cm>
-</p:cmLst>
-</file>
-
-<file path=ppt/comments/comment47.xml><?xml version="1.0" encoding="utf-8"?>
-<p:cmLst xmlns:a="http://schemas.openxmlformats.org/drawingml/2006/main" xmlns:r="http://schemas.openxmlformats.org/officeDocument/2006/relationships" xmlns:p="http://schemas.openxmlformats.org/presentationml/2006/main">
-  <p:cm authorId="0" dt="2014-06-18T13:50:14.289" idx="73">
-    <p:pos x="1" y="1"/>
-    <p:text>Graphics placeholders can be moved, copied, resized and rearranged as needed to accommodate up to six images.
-Customize it: For a four-up layout, halve the height of the two boxes and copy/paste in duplicates to go below them.</p:text>
-  </p:cm>
-</p:cmLst>
-</file>
-
-<file path=ppt/comments/comment48.xml><?xml version="1.0" encoding="utf-8"?>
-<p:cmLst xmlns:a="http://schemas.openxmlformats.org/drawingml/2006/main" xmlns:r="http://schemas.openxmlformats.org/officeDocument/2006/relationships" xmlns:p="http://schemas.openxmlformats.org/presentationml/2006/main">
-  <p:cm authorId="0" dt="2014-06-18T13:43:35.548" idx="74">
-    <p:pos x="-3" y="5"/>
-    <p:text>Customize it: Feel free to add an image or graphic to the right side of the box, if needed.</p:text>
-  </p:cm>
-</p:cmLst>
-</file>
-
-<file path=ppt/comments/comment49.xml><?xml version="1.0" encoding="utf-8"?>
-<p:cmLst xmlns:a="http://schemas.openxmlformats.org/drawingml/2006/main" xmlns:r="http://schemas.openxmlformats.org/officeDocument/2006/relationships" xmlns:p="http://schemas.openxmlformats.org/presentationml/2006/main">
-  <p:cm authorId="0" dt="2014-06-18T13:43:35.548" idx="32">
-    <p:pos x="-3" y="5"/>
-    <p:text>Customize it: Feel free to add an image or graphic to the right side of the box, if needed.</p:text>
-  </p:cm>
-</p:cmLst>
-</file>
-
-<file path=ppt/comments/comment5.xml><?xml version="1.0" encoding="utf-8"?>
-<p:cmLst xmlns:a="http://schemas.openxmlformats.org/drawingml/2006/main" xmlns:r="http://schemas.openxmlformats.org/officeDocument/2006/relationships" xmlns:p="http://schemas.openxmlformats.org/presentationml/2006/main">
-  <p:cm authorId="0" dt="2014-06-18T13:43:35.548" idx="33">
-    <p:pos x="-3" y="5"/>
-    <p:text>Customize it: Feel free to add an image or graphic to the right side of the box, if needed.</p:text>
-  </p:cm>
-</p:cmLst>
-</file>
-
-<file path=ppt/comments/comment50.xml><?xml version="1.0" encoding="utf-8"?>
-<p:cmLst xmlns:a="http://schemas.openxmlformats.org/drawingml/2006/main" xmlns:r="http://schemas.openxmlformats.org/officeDocument/2006/relationships" xmlns:p="http://schemas.openxmlformats.org/presentationml/2006/main">
-  <p:cm authorId="0" dt="2014-06-18T13:55:45.724" idx="18">
-    <p:pos x="-4" y="-9"/>
-    <p:text>Customize it: Thank you slide can also be used to provide additional contact information.</p:text>
-  </p:cm>
-</p:cmLst>
-</file>
-
-<file path=ppt/comments/comment6.xml><?xml version="1.0" encoding="utf-8"?>
-<p:cmLst xmlns:a="http://schemas.openxmlformats.org/drawingml/2006/main" xmlns:r="http://schemas.openxmlformats.org/officeDocument/2006/relationships" xmlns:p="http://schemas.openxmlformats.org/presentationml/2006/main">
-  <p:cm authorId="0" dt="2014-06-18T13:51:52.120" idx="34">
-    <p:pos x="-10" y="6"/>
-    <p:text>This layout is for a single image, chart or infographic to fill the entire live space of the slide.
-Customize it: Add a text box filled with white as a caption, if needed.
-For a true full frame slide image (no title), use the Blank slide master, it has no title placeholder and no gray rule, and use the Insert &gt; Picture command.</p:text>
-  </p:cm>
-</p:cmLst>
-</file>
-
-<file path=ppt/comments/comment7.xml><?xml version="1.0" encoding="utf-8"?>
-<p:cmLst xmlns:a="http://schemas.openxmlformats.org/drawingml/2006/main" xmlns:r="http://schemas.openxmlformats.org/officeDocument/2006/relationships" xmlns:p="http://schemas.openxmlformats.org/presentationml/2006/main">
-  <p:cm authorId="0" dt="2014-06-18T13:42:07.881" idx="35">
-    <p:pos x="1" y="0"/>
-    <p:text>The gray background box is locked. A blank version (no gray box) is available if needed.
-Customize it: Move the quote marks to fit around your text. The text placeholder can be changed as needed, if you wish to use smaller text and add an image or graphic. </p:text>
-  </p:cm>
-</p:cmLst>
-</file>
-
-<file path=ppt/comments/comment8.xml><?xml version="1.0" encoding="utf-8"?>
-<p:cmLst xmlns:a="http://schemas.openxmlformats.org/drawingml/2006/main" xmlns:r="http://schemas.openxmlformats.org/officeDocument/2006/relationships" xmlns:p="http://schemas.openxmlformats.org/presentationml/2006/main">
-  <p:cm authorId="0" dt="2014-06-18T13:43:35.548" idx="5">
-    <p:pos x="-3" y="5"/>
-    <p:text>Customize it: Feel free to add an image or graphic to the right side of the box, if needed.</p:text>
-  </p:cm>
-</p:cmLst>
-</file>
-
-<file path=ppt/comments/comment9.xml><?xml version="1.0" encoding="utf-8"?>
-<p:cmLst xmlns:a="http://schemas.openxmlformats.org/drawingml/2006/main" xmlns:r="http://schemas.openxmlformats.org/officeDocument/2006/relationships" xmlns:p="http://schemas.openxmlformats.org/presentationml/2006/main">
-  <p:cm authorId="0" dt="2014-06-18T13:50:14.289" idx="36">
-    <p:pos x="1" y="1"/>
-    <p:text>Graphics placeholders can be moved, copied, resized and rearranged as needed to accommodate up to six images.
-Customize it: For a four-up layout, halve the height of the two boxes and copy/paste in duplicates to go below them.</p:text>
-  </p:cm>
-</p:cmLst>
 </file>
 
 <file path=ppt/notesMasters/notesMaster1.xml><?xml version="1.0" encoding="utf-8"?>
@@ -724,7 +318,7 @@
           <a:p>
             <a:fld id="{0578919B-B269-4846-8817-A4C15700AC8B}" type="datetimeFigureOut">
               <a:rPr lang="en-US" smtClean="0"/>
-              <a:t>7/30/14</a:t>
+              <a:t>8/4/2014</a:t>
             </a:fld>
             <a:endParaRPr lang="en-US"/>
           </a:p>
@@ -1234,7 +828,7 @@
           <a:p>
             <a:fld id="{CDF4BCEB-1ED2-43B7-8E65-75C9E9E32522}" type="datetime1">
               <a:rPr lang="en-US" smtClean="0"/>
-              <a:t>7/30/14</a:t>
+              <a:t>8/4/2014</a:t>
             </a:fld>
             <a:endParaRPr lang="en-US"/>
           </a:p>
@@ -1571,7 +1165,7 @@
           <a:p>
             <a:fld id="{F2026B33-641A-4E16-9A55-368855EAD406}" type="datetime1">
               <a:rPr lang="en-US" smtClean="0"/>
-              <a:t>7/30/14</a:t>
+              <a:t>8/4/2014</a:t>
             </a:fld>
             <a:endParaRPr lang="en-US"/>
           </a:p>
@@ -1879,7 +1473,7 @@
           <a:p>
             <a:fld id="{1EBD16FF-D5DD-4F8E-94CD-8A248968D1C1}" type="datetime1">
               <a:rPr lang="en-US" smtClean="0"/>
-              <a:t>7/30/14</a:t>
+              <a:t>8/4/2014</a:t>
             </a:fld>
             <a:endParaRPr lang="en-US"/>
           </a:p>
@@ -2187,7 +1781,7 @@
           <a:p>
             <a:fld id="{084B7365-15C8-4643-9F41-3D6B02B31675}" type="datetime1">
               <a:rPr lang="en-US" smtClean="0"/>
-              <a:t>7/30/14</a:t>
+              <a:t>8/4/2014</a:t>
             </a:fld>
             <a:endParaRPr lang="en-US"/>
           </a:p>
@@ -2585,7 +2179,7 @@
           <a:p>
             <a:fld id="{AB3DCC3F-630E-430B-9A87-B15516C6F711}" type="datetime1">
               <a:rPr lang="en-US" smtClean="0"/>
-              <a:t>7/30/14</a:t>
+              <a:t>8/4/2014</a:t>
             </a:fld>
             <a:endParaRPr lang="en-US"/>
           </a:p>
@@ -2922,7 +2516,7 @@
           <a:p>
             <a:fld id="{C3C47847-7679-4365-B433-C97EB7B278CA}" type="datetime1">
               <a:rPr lang="en-US" smtClean="0"/>
-              <a:t>7/30/14</a:t>
+              <a:t>8/4/2014</a:t>
             </a:fld>
             <a:endParaRPr lang="en-US"/>
           </a:p>
@@ -3387,7 +2981,7 @@
           <a:p>
             <a:fld id="{EC8CE169-8323-409A-AC80-DBE02E72E29F}" type="datetime1">
               <a:rPr lang="en-US" smtClean="0"/>
-              <a:t>7/30/14</a:t>
+              <a:t>8/4/2014</a:t>
             </a:fld>
             <a:endParaRPr lang="en-US"/>
           </a:p>
@@ -3866,7 +3460,7 @@
           <a:p>
             <a:fld id="{15CC9321-31B7-4E6B-A1E5-C9B755013E8E}" type="datetime1">
               <a:rPr lang="en-US" smtClean="0"/>
-              <a:t>7/30/14</a:t>
+              <a:t>8/4/2014</a:t>
             </a:fld>
             <a:endParaRPr lang="en-US"/>
           </a:p>
@@ -4352,7 +3946,7 @@
       </p:pic>
       <p:pic>
         <p:nvPicPr>
-          <p:cNvPr id="38" name="Picture Placeholder 51"/>
+          <p:cNvPr id="39" name="Picture Placeholder 60"/>
           <p:cNvPicPr>
             <a:picLocks noChangeAspect="1"/>
           </p:cNvPicPr>
@@ -4360,42 +3954,6 @@
         </p:nvPicPr>
         <p:blipFill>
           <a:blip r:embed="rId14">
-            <a:extLst>
-              <a:ext uri="{28A0092B-C50C-407E-A947-70E740481C1C}">
-                <a14:useLocalDpi xmlns:a14="http://schemas.microsoft.com/office/drawing/2010/main" val="0"/>
-              </a:ext>
-            </a:extLst>
-          </a:blip>
-          <a:srcRect l="9680" r="9680"/>
-          <a:stretch>
-            <a:fillRect/>
-          </a:stretch>
-        </p:blipFill>
-        <p:spPr>
-          <a:xfrm>
-            <a:off x="6275939" y="4602570"/>
-            <a:ext cx="760372" cy="943337"/>
-          </a:xfrm>
-          <a:prstGeom prst="rect">
-            <a:avLst/>
-          </a:prstGeom>
-          <a:solidFill>
-            <a:schemeClr val="bg1">
-              <a:lumMod val="95000"/>
-            </a:schemeClr>
-          </a:solidFill>
-        </p:spPr>
-      </p:pic>
-      <p:pic>
-        <p:nvPicPr>
-          <p:cNvPr id="39" name="Picture Placeholder 60"/>
-          <p:cNvPicPr>
-            <a:picLocks noChangeAspect="1"/>
-          </p:cNvPicPr>
-          <p:nvPr userDrawn="1"/>
-        </p:nvPicPr>
-        <p:blipFill>
-          <a:blip r:embed="rId15">
             <a:grayscl/>
             <a:extLst>
               <a:ext uri="{28A0092B-C50C-407E-A947-70E740481C1C}">
@@ -4432,7 +3990,7 @@
           <p:nvPr userDrawn="1"/>
         </p:nvPicPr>
         <p:blipFill>
-          <a:blip r:embed="rId16">
+          <a:blip r:embed="rId15">
             <a:grayscl/>
             <a:extLst>
               <a:ext uri="{28A0092B-C50C-407E-A947-70E740481C1C}">
@@ -4469,7 +4027,7 @@
           <p:nvPr userDrawn="1"/>
         </p:nvPicPr>
         <p:blipFill>
-          <a:blip r:embed="rId17">
+          <a:blip r:embed="rId16">
             <a:grayscl/>
             <a:extLst>
               <a:ext uri="{28A0092B-C50C-407E-A947-70E740481C1C}">
@@ -4497,6 +4055,36 @@
           </a:solidFill>
         </p:spPr>
       </p:pic>
+      <p:pic>
+        <p:nvPicPr>
+          <p:cNvPr id="9" name="Picture 8"/>
+          <p:cNvPicPr>
+            <a:picLocks noChangeAspect="1"/>
+          </p:cNvPicPr>
+          <p:nvPr userDrawn="1"/>
+        </p:nvPicPr>
+        <p:blipFill rotWithShape="1">
+          <a:blip r:embed="rId17" cstate="print">
+            <a:grayscl/>
+            <a:extLst>
+              <a:ext uri="{28A0092B-C50C-407E-A947-70E740481C1C}">
+                <a14:useLocalDpi xmlns:a14="http://schemas.microsoft.com/office/drawing/2010/main" val="0"/>
+              </a:ext>
+            </a:extLst>
+          </a:blip>
+          <a:srcRect b="16248"/>
+          <a:stretch/>
+        </p:blipFill>
+        <p:spPr>
+          <a:xfrm>
+            <a:off x="6275937" y="4602570"/>
+            <a:ext cx="758952" cy="950179"/>
+          </a:xfrm>
+          <a:prstGeom prst="rect">
+            <a:avLst/>
+          </a:prstGeom>
+        </p:spPr>
+      </p:pic>
     </p:spTree>
     <p:extLst>
       <p:ext uri="{BB962C8B-B14F-4D97-AF65-F5344CB8AC3E}">
@@ -4519,6 +4107,13 @@
       </p:transition>
     </mc:Fallback>
   </mc:AlternateContent>
+  <p:timing>
+    <p:tnLst>
+      <p:par>
+        <p:cTn id="1" dur="indefinite" restart="never" nodeType="tmRoot"/>
+      </p:par>
+    </p:tnLst>
+  </p:timing>
 </p:sldLayout>
 </file>
 
@@ -4583,7 +4178,7 @@
           <a:p>
             <a:fld id="{99993DE0-99B1-4C26-861D-C8C18623DFA8}" type="datetime1">
               <a:rPr lang="en-US" smtClean="0"/>
-              <a:t>7/30/14</a:t>
+              <a:t>8/4/2014</a:t>
             </a:fld>
             <a:endParaRPr lang="en-US"/>
           </a:p>
@@ -4969,7 +4564,7 @@
           <a:p>
             <a:fld id="{F36997A6-A73D-4941-B893-D030BAFEB78C}" type="datetime1">
               <a:rPr lang="en-US" smtClean="0"/>
-              <a:t>7/30/14</a:t>
+              <a:t>8/4/2014</a:t>
             </a:fld>
             <a:endParaRPr lang="en-US"/>
           </a:p>
@@ -5316,7 +4911,7 @@
           <a:p>
             <a:fld id="{AB3DCC3F-630E-430B-9A87-B15516C6F711}" type="datetime1">
               <a:rPr lang="en-US" smtClean="0"/>
-              <a:t>7/30/14</a:t>
+              <a:t>8/4/2014</a:t>
             </a:fld>
             <a:endParaRPr lang="en-US"/>
           </a:p>
@@ -5969,7 +5564,7 @@
           <a:p>
             <a:fld id="{1457D0D8-3C2B-41E1-8635-870DC53B26D3}" type="datetime1">
               <a:rPr lang="en-US" smtClean="0"/>
-              <a:t>7/30/14</a:t>
+              <a:t>8/4/2014</a:t>
             </a:fld>
             <a:endParaRPr lang="en-US"/>
           </a:p>
@@ -6250,7 +5845,7 @@
           <a:p>
             <a:fld id="{CCCE06F0-F7D7-4AB2-A689-F9323A49D862}" type="datetime1">
               <a:rPr lang="en-US" smtClean="0"/>
-              <a:t>7/30/14</a:t>
+              <a:t>8/4/2014</a:t>
             </a:fld>
             <a:endParaRPr lang="en-US"/>
           </a:p>
@@ -7017,7 +6612,7 @@
           <a:p>
             <a:fld id="{CCCE06F0-F7D7-4AB2-A689-F9323A49D862}" type="datetime1">
               <a:rPr lang="en-US" smtClean="0"/>
-              <a:t>7/30/14</a:t>
+              <a:t>8/4/2014</a:t>
             </a:fld>
             <a:endParaRPr lang="en-US"/>
           </a:p>
@@ -7636,7 +7231,7 @@
           <a:p>
             <a:fld id="{CCCE06F0-F7D7-4AB2-A689-F9323A49D862}" type="datetime1">
               <a:rPr lang="en-US" smtClean="0"/>
-              <a:t>7/30/14</a:t>
+              <a:t>8/4/2014</a:t>
             </a:fld>
             <a:endParaRPr lang="en-US"/>
           </a:p>
@@ -7747,7 +7342,7 @@
           <a:p>
             <a:fld id="{04488122-8F9C-43A5-85EC-8ACC99111EC1}" type="datetime1">
               <a:rPr lang="en-US" smtClean="0"/>
-              <a:t>7/30/14</a:t>
+              <a:t>8/4/2014</a:t>
             </a:fld>
             <a:endParaRPr lang="en-US"/>
           </a:p>
@@ -8029,7 +7624,7 @@
           <a:p>
             <a:fld id="{93A78E68-8047-4C91-8462-18C8EA6C4A26}" type="datetime1">
               <a:rPr lang="en-US" smtClean="0"/>
-              <a:t>7/30/14</a:t>
+              <a:t>8/4/2014</a:t>
             </a:fld>
             <a:endParaRPr lang="en-US"/>
           </a:p>
@@ -8461,7 +8056,7 @@
           <a:p>
             <a:fld id="{96A812C5-1200-4801-8BC6-2CE7897ED399}" type="datetime1">
               <a:rPr lang="en-US" smtClean="0"/>
-              <a:t>7/30/14</a:t>
+              <a:t>8/4/2014</a:t>
             </a:fld>
             <a:endParaRPr lang="en-US"/>
           </a:p>
@@ -8815,7 +8410,7 @@
           <a:p>
             <a:fld id="{96A812C5-1200-4801-8BC6-2CE7897ED399}" type="datetime1">
               <a:rPr lang="en-US" smtClean="0"/>
-              <a:t>7/30/14</a:t>
+              <a:t>8/4/2014</a:t>
             </a:fld>
             <a:endParaRPr lang="en-US"/>
           </a:p>
@@ -9169,7 +8764,7 @@
           <a:p>
             <a:fld id="{96A812C5-1200-4801-8BC6-2CE7897ED399}" type="datetime1">
               <a:rPr lang="en-US" smtClean="0"/>
-              <a:t>7/30/14</a:t>
+              <a:t>8/4/2014</a:t>
             </a:fld>
             <a:endParaRPr lang="en-US"/>
           </a:p>
@@ -9421,7 +9016,7 @@
           <a:p>
             <a:fld id="{F868F056-E25A-4B06-897A-C91173840232}" type="datetime1">
               <a:rPr lang="en-US" smtClean="0"/>
-              <a:t>7/30/14</a:t>
+              <a:t>8/4/2014</a:t>
             </a:fld>
             <a:endParaRPr lang="en-US"/>
           </a:p>
@@ -9712,7 +9307,7 @@
           <a:p>
             <a:fld id="{F868F056-E25A-4B06-897A-C91173840232}" type="datetime1">
               <a:rPr lang="en-US" smtClean="0"/>
-              <a:t>7/30/14</a:t>
+              <a:t>8/4/2014</a:t>
             </a:fld>
             <a:endParaRPr lang="en-US"/>
           </a:p>
@@ -10003,7 +9598,7 @@
           <a:p>
             <a:fld id="{F868F056-E25A-4B06-897A-C91173840232}" type="datetime1">
               <a:rPr lang="en-US" smtClean="0"/>
-              <a:t>7/30/14</a:t>
+              <a:t>8/4/2014</a:t>
             </a:fld>
             <a:endParaRPr lang="en-US"/>
           </a:p>
@@ -10334,7 +9929,7 @@
           <a:p>
             <a:fld id="{E37B26B7-000A-46A7-8375-D4F15B6A04F5}" type="datetime1">
               <a:rPr lang="en-US" smtClean="0"/>
-              <a:t>7/30/14</a:t>
+              <a:t>8/4/2014</a:t>
             </a:fld>
             <a:endParaRPr lang="en-US"/>
           </a:p>
@@ -10597,7 +10192,7 @@
   <p:timing>
     <p:tnLst>
       <p:par>
-        <p:cTn xmlns:p14="http://schemas.microsoft.com/office/powerpoint/2010/main" id="1" dur="indefinite" restart="never" nodeType="tmRoot"/>
+        <p:cTn id="1" dur="indefinite" restart="never" nodeType="tmRoot"/>
       </p:par>
     </p:tnLst>
   </p:timing>
@@ -11061,11 +10656,6 @@
               </a:rPr>
               <a:t>Tim Myer</a:t>
             </a:r>
-            <a:endParaRPr lang="en-US" sz="900" dirty="0" smtClean="0">
-              <a:solidFill>
-                <a:srgbClr val="88807A"/>
-              </a:solidFill>
-            </a:endParaRPr>
           </a:p>
           <a:p>
             <a:r>
@@ -11076,11 +10666,6 @@
               </a:rPr>
               <a:t>Programmer</a:t>
             </a:r>
-            <a:endParaRPr lang="en-US" sz="900" dirty="0" smtClean="0">
-              <a:solidFill>
-                <a:srgbClr val="88807A"/>
-              </a:solidFill>
-            </a:endParaRPr>
           </a:p>
           <a:p>
             <a:r>
@@ -11125,7 +10710,7 @@
   <p:timing>
     <p:tnLst>
       <p:par>
-        <p:cTn xmlns:p14="http://schemas.microsoft.com/office/powerpoint/2010/main" id="1" dur="indefinite" restart="never" nodeType="tmRoot"/>
+        <p:cTn id="1" dur="indefinite" restart="never" nodeType="tmRoot"/>
       </p:par>
     </p:tnLst>
   </p:timing>
@@ -11336,7 +10921,7 @@
   <p:timing>
     <p:tnLst>
       <p:par>
-        <p:cTn xmlns:p14="http://schemas.microsoft.com/office/powerpoint/2010/main" id="1" dur="indefinite" restart="never" nodeType="tmRoot"/>
+        <p:cTn id="1" dur="indefinite" restart="never" nodeType="tmRoot"/>
       </p:par>
     </p:tnLst>
   </p:timing>
@@ -11558,7 +11143,7 @@
   <p:timing>
     <p:tnLst>
       <p:par>
-        <p:cTn xmlns:p14="http://schemas.microsoft.com/office/powerpoint/2010/main" id="1" dur="indefinite" restart="never" nodeType="tmRoot"/>
+        <p:cTn id="1" dur="indefinite" restart="never" nodeType="tmRoot"/>
       </p:par>
     </p:tnLst>
   </p:timing>
@@ -11724,7 +11309,7 @@
   <p:timing>
     <p:tnLst>
       <p:par>
-        <p:cTn xmlns:p14="http://schemas.microsoft.com/office/powerpoint/2010/main" id="1" dur="indefinite" restart="never" nodeType="tmRoot">
+        <p:cTn id="1" dur="indefinite" restart="never" nodeType="tmRoot">
           <p:childTnLst>
             <p:seq concurrent="1" nextAc="seek">
               <p:cTn id="2" dur="indefinite" nodeType="mainSeq">
@@ -12069,7 +11654,7 @@
   <p:timing>
     <p:tnLst>
       <p:par>
-        <p:cTn xmlns:p14="http://schemas.microsoft.com/office/powerpoint/2010/main" id="1" dur="indefinite" restart="never" nodeType="tmRoot"/>
+        <p:cTn id="1" dur="indefinite" restart="never" nodeType="tmRoot"/>
       </p:par>
     </p:tnLst>
   </p:timing>
@@ -12229,7 +11814,7 @@
   <p:timing>
     <p:tnLst>
       <p:par>
-        <p:cTn xmlns:p14="http://schemas.microsoft.com/office/powerpoint/2010/main" id="1" dur="indefinite" restart="never" nodeType="tmRoot"/>
+        <p:cTn id="1" dur="indefinite" restart="never" nodeType="tmRoot"/>
       </p:par>
     </p:tnLst>
   </p:timing>
@@ -12365,7 +11950,7 @@
   <p:timing>
     <p:tnLst>
       <p:par>
-        <p:cTn xmlns:p14="http://schemas.microsoft.com/office/powerpoint/2010/main" id="1" dur="indefinite" restart="never" nodeType="tmRoot"/>
+        <p:cTn id="1" dur="indefinite" restart="never" nodeType="tmRoot"/>
       </p:par>
     </p:tnLst>
   </p:timing>
@@ -12645,7 +12230,6 @@
               <a:rPr lang="en-US" sz="2800" dirty="0" smtClean="0"/>
               <a:t>!</a:t>
             </a:r>
-            <a:endParaRPr lang="en-US" sz="2800" dirty="0" smtClean="0"/>
           </a:p>
         </p:txBody>
       </p:sp>
@@ -12674,7 +12258,7 @@
   <p:timing>
     <p:tnLst>
       <p:par>
-        <p:cTn xmlns:p14="http://schemas.microsoft.com/office/powerpoint/2010/main" id="1" dur="indefinite" restart="never" nodeType="tmRoot">
+        <p:cTn id="1" dur="indefinite" restart="never" nodeType="tmRoot">
           <p:childTnLst>
             <p:seq concurrent="1" nextAc="seek">
               <p:cTn id="2" dur="indefinite" nodeType="mainSeq">
@@ -13006,7 +12590,7 @@
   <p:timing>
     <p:tnLst>
       <p:par>
-        <p:cTn xmlns:p14="http://schemas.microsoft.com/office/powerpoint/2010/main" id="1" dur="indefinite" restart="never" nodeType="tmRoot"/>
+        <p:cTn id="1" dur="indefinite" restart="never" nodeType="tmRoot"/>
       </p:par>
     </p:tnLst>
   </p:timing>
@@ -13142,7 +12726,7 @@
   <p:timing>
     <p:tnLst>
       <p:par>
-        <p:cTn xmlns:p14="http://schemas.microsoft.com/office/powerpoint/2010/main" id="1" dur="indefinite" restart="never" nodeType="tmRoot"/>
+        <p:cTn id="1" dur="indefinite" restart="never" nodeType="tmRoot"/>
       </p:par>
     </p:tnLst>
   </p:timing>
@@ -13792,7 +13376,7 @@
   <p:timing>
     <p:tnLst>
       <p:par>
-        <p:cTn xmlns:p14="http://schemas.microsoft.com/office/powerpoint/2010/main" id="1" dur="indefinite" restart="never" nodeType="tmRoot"/>
+        <p:cTn id="1" dur="indefinite" restart="never" nodeType="tmRoot"/>
       </p:par>
     </p:tnLst>
   </p:timing>
@@ -13861,13 +13445,8 @@
             </a:pPr>
             <a:r>
               <a:rPr lang="en-US" dirty="0" smtClean="0"/>
-              <a:t>Join a great team of developers, consultants and Agile experts at a company that is Agile thr</a:t>
-            </a:r>
-            <a:r>
-              <a:rPr lang="en-US" dirty="0" smtClean="0"/>
-              <a:t>ough and through.</a:t>
-            </a:r>
-            <a:endParaRPr lang="en-US" dirty="0" smtClean="0"/>
+              <a:t>Join a great team of developers, consultants and Agile experts at a company that is Agile through and through.</a:t>
+            </a:r>
           </a:p>
           <a:p>
             <a:pPr lvl="2">
@@ -13879,7 +13458,6 @@
               <a:rPr lang="en-US" dirty="0" smtClean="0"/>
               <a:t>We are hiring XP developers and coaches. </a:t>
             </a:r>
-            <a:endParaRPr lang="en-US" dirty="0" smtClean="0"/>
           </a:p>
           <a:p>
             <a:pPr lvl="2">
@@ -13984,7 +13562,7 @@
   <p:timing>
     <p:tnLst>
       <p:par>
-        <p:cTn xmlns:p14="http://schemas.microsoft.com/office/powerpoint/2010/main" id="1" dur="indefinite" restart="never" nodeType="tmRoot"/>
+        <p:cTn id="1" dur="indefinite" restart="never" nodeType="tmRoot"/>
       </p:par>
     </p:tnLst>
   </p:timing>
@@ -14630,7 +14208,7 @@
   <p:timing>
     <p:tnLst>
       <p:par>
-        <p:cTn xmlns:p14="http://schemas.microsoft.com/office/powerpoint/2010/main" id="1" dur="indefinite" restart="never" nodeType="tmRoot"/>
+        <p:cTn id="1" dur="indefinite" restart="never" nodeType="tmRoot"/>
       </p:par>
     </p:tnLst>
   </p:timing>
@@ -14790,7 +14368,7 @@
   <p:timing>
     <p:tnLst>
       <p:par>
-        <p:cTn xmlns:p14="http://schemas.microsoft.com/office/powerpoint/2010/main" id="1" dur="indefinite" restart="never" nodeType="tmRoot"/>
+        <p:cTn id="1" dur="indefinite" restart="never" nodeType="tmRoot"/>
       </p:par>
     </p:tnLst>
   </p:timing>
@@ -15436,7 +15014,7 @@
   <p:timing>
     <p:tnLst>
       <p:par>
-        <p:cTn xmlns:p14="http://schemas.microsoft.com/office/powerpoint/2010/main" id="1" dur="indefinite" restart="never" nodeType="tmRoot"/>
+        <p:cTn id="1" dur="indefinite" restart="never" nodeType="tmRoot"/>
       </p:par>
     </p:tnLst>
   </p:timing>
@@ -15534,11 +15112,7 @@
           <a:p>
             <a:r>
               <a:rPr lang="en-US" sz="3600" dirty="0" smtClean="0"/>
-              <a:t>our account info</a:t>
-            </a:r>
-            <a:r>
-              <a:rPr lang="en-US" sz="3600" dirty="0" smtClean="0"/>
-              <a:t>?</a:t>
+              <a:t>our account info?</a:t>
             </a:r>
             <a:endParaRPr lang="en-US" sz="3600" dirty="0"/>
           </a:p>
@@ -15638,7 +15212,7 @@
   <p:timing>
     <p:tnLst>
       <p:par>
-        <p:cTn xmlns:p14="http://schemas.microsoft.com/office/powerpoint/2010/main" id="1" dur="indefinite" restart="never" nodeType="tmRoot"/>
+        <p:cTn id="1" dur="indefinite" restart="never" nodeType="tmRoot"/>
       </p:par>
     </p:tnLst>
   </p:timing>
@@ -15774,7 +15348,7 @@
   <p:timing>
     <p:tnLst>
       <p:par>
-        <p:cTn xmlns:p14="http://schemas.microsoft.com/office/powerpoint/2010/main" id="1" dur="indefinite" restart="never" nodeType="tmRoot"/>
+        <p:cTn id="1" dur="indefinite" restart="never" nodeType="tmRoot"/>
       </p:par>
     </p:tnLst>
   </p:timing>
@@ -16104,7 +15678,6 @@
               <a:rPr lang="en-US" sz="2800" dirty="0" smtClean="0"/>
               <a:t>The Future!</a:t>
             </a:r>
-            <a:endParaRPr lang="en-US" sz="2800" dirty="0" smtClean="0"/>
           </a:p>
         </p:txBody>
       </p:sp>
@@ -16133,7 +15706,7 @@
   <p:timing>
     <p:tnLst>
       <p:par>
-        <p:cTn xmlns:p14="http://schemas.microsoft.com/office/powerpoint/2010/main" id="1" dur="indefinite" restart="never" nodeType="tmRoot">
+        <p:cTn id="1" dur="indefinite" restart="never" nodeType="tmRoot">
           <p:childTnLst>
             <p:seq concurrent="1" nextAc="seek">
               <p:cTn id="2" dur="indefinite" nodeType="mainSeq">
@@ -16424,7 +15997,7 @@
   <p:timing>
     <p:tnLst>
       <p:par>
-        <p:cTn xmlns:p14="http://schemas.microsoft.com/office/powerpoint/2010/main" id="1" dur="indefinite" restart="never" nodeType="tmRoot">
+        <p:cTn id="1" dur="indefinite" restart="never" nodeType="tmRoot">
           <p:childTnLst>
             <p:seq concurrent="1" nextAc="seek">
               <p:cTn id="2" dur="indefinite" nodeType="mainSeq">
@@ -17122,7 +16695,7 @@
   <p:timing>
     <p:tnLst>
       <p:par>
-        <p:cTn xmlns:p14="http://schemas.microsoft.com/office/powerpoint/2010/main" id="1" dur="indefinite" restart="never" nodeType="tmRoot"/>
+        <p:cTn id="1" dur="indefinite" restart="never" nodeType="tmRoot"/>
       </p:par>
     </p:tnLst>
   </p:timing>
@@ -17345,7 +16918,7 @@
   <p:timing>
     <p:tnLst>
       <p:par>
-        <p:cTn xmlns:p14="http://schemas.microsoft.com/office/powerpoint/2010/main" id="1" dur="indefinite" restart="never" nodeType="tmRoot"/>
+        <p:cTn id="1" dur="indefinite" restart="never" nodeType="tmRoot"/>
       </p:par>
     </p:tnLst>
   </p:timing>
@@ -17509,7 +17082,7 @@
   <p:timing>
     <p:tnLst>
       <p:par>
-        <p:cTn xmlns:p14="http://schemas.microsoft.com/office/powerpoint/2010/main" id="1" dur="indefinite" restart="never" nodeType="tmRoot"/>
+        <p:cTn id="1" dur="indefinite" restart="never" nodeType="tmRoot"/>
       </p:par>
     </p:tnLst>
   </p:timing>
@@ -17716,7 +17289,6 @@
               <a:rPr lang="en-US" sz="3600" dirty="0"/>
               <a:t> [sic] out how to shoot yourself in the foot with one line of code… recursively.</a:t>
             </a:r>
-            <a:endParaRPr lang="en-US" sz="3600" dirty="0"/>
           </a:p>
         </p:txBody>
       </p:sp>
@@ -17851,7 +17423,7 @@
   <p:timing>
     <p:tnLst>
       <p:par>
-        <p:cTn xmlns:p14="http://schemas.microsoft.com/office/powerpoint/2010/main" id="1" dur="indefinite" restart="never" nodeType="tmRoot"/>
+        <p:cTn id="1" dur="indefinite" restart="never" nodeType="tmRoot"/>
       </p:par>
     </p:tnLst>
   </p:timing>
@@ -17987,7 +17559,7 @@
   <p:timing>
     <p:tnLst>
       <p:par>
-        <p:cTn xmlns:p14="http://schemas.microsoft.com/office/powerpoint/2010/main" id="1" dur="indefinite" restart="never" nodeType="tmRoot"/>
+        <p:cTn id="1" dur="indefinite" restart="never" nodeType="tmRoot"/>
       </p:par>
     </p:tnLst>
   </p:timing>
@@ -18234,7 +17806,6 @@
               <a:rPr lang="en-US" sz="2800" dirty="0" smtClean="0"/>
               <a:t>Iterating over an optional value</a:t>
             </a:r>
-            <a:endParaRPr lang="en-US" sz="2800" dirty="0" smtClean="0"/>
           </a:p>
         </p:txBody>
       </p:sp>
@@ -18263,7 +17834,7 @@
   <p:timing>
     <p:tnLst>
       <p:par>
-        <p:cTn xmlns:p14="http://schemas.microsoft.com/office/powerpoint/2010/main" id="1" dur="indefinite" restart="never" nodeType="tmRoot">
+        <p:cTn id="1" dur="indefinite" restart="never" nodeType="tmRoot">
           <p:childTnLst>
             <p:seq concurrent="1" nextAc="seek">
               <p:cTn id="2" dur="indefinite" nodeType="mainSeq">
@@ -18501,7 +18072,7 @@
   <p:timing>
     <p:tnLst>
       <p:par>
-        <p:cTn xmlns:p14="http://schemas.microsoft.com/office/powerpoint/2010/main" id="1" dur="indefinite" restart="never" nodeType="tmRoot"/>
+        <p:cTn id="1" dur="indefinite" restart="never" nodeType="tmRoot"/>
       </p:par>
     </p:tnLst>
   </p:timing>
@@ -18921,7 +18492,7 @@
   <p:timing>
     <p:tnLst>
       <p:par>
-        <p:cTn xmlns:p14="http://schemas.microsoft.com/office/powerpoint/2010/main" id="1" dur="indefinite" restart="never" nodeType="tmRoot"/>
+        <p:cTn id="1" dur="indefinite" restart="never" nodeType="tmRoot"/>
       </p:par>
     </p:tnLst>
   </p:timing>
@@ -19363,7 +18934,7 @@
   <p:timing>
     <p:tnLst>
       <p:par>
-        <p:cTn xmlns:p14="http://schemas.microsoft.com/office/powerpoint/2010/main" id="1" dur="indefinite" restart="never" nodeType="tmRoot"/>
+        <p:cTn id="1" dur="indefinite" restart="never" nodeType="tmRoot"/>
       </p:par>
     </p:tnLst>
   </p:timing>
@@ -19775,7 +19346,7 @@
   <p:timing>
     <p:tnLst>
       <p:par>
-        <p:cTn xmlns:p14="http://schemas.microsoft.com/office/powerpoint/2010/main" id="1" dur="indefinite" restart="never" nodeType="tmRoot"/>
+        <p:cTn id="1" dur="indefinite" restart="never" nodeType="tmRoot"/>
       </p:par>
     </p:tnLst>
   </p:timing>
@@ -19935,7 +19506,7 @@
   <p:timing>
     <p:tnLst>
       <p:par>
-        <p:cTn xmlns:p14="http://schemas.microsoft.com/office/powerpoint/2010/main" id="1" dur="indefinite" restart="never" nodeType="tmRoot"/>
+        <p:cTn id="1" dur="indefinite" restart="never" nodeType="tmRoot"/>
       </p:par>
     </p:tnLst>
   </p:timing>
@@ -20071,7 +19642,7 @@
   <p:timing>
     <p:tnLst>
       <p:par>
-        <p:cTn xmlns:p14="http://schemas.microsoft.com/office/powerpoint/2010/main" id="1" dur="indefinite" restart="never" nodeType="tmRoot"/>
+        <p:cTn id="1" dur="indefinite" restart="never" nodeType="tmRoot"/>
       </p:par>
     </p:tnLst>
   </p:timing>
@@ -20715,7 +20286,7 @@
   <p:timing>
     <p:tnLst>
       <p:par>
-        <p:cTn xmlns:p14="http://schemas.microsoft.com/office/powerpoint/2010/main" id="1" dur="indefinite" restart="never" nodeType="tmRoot"/>
+        <p:cTn id="1" dur="indefinite" restart="never" nodeType="tmRoot"/>
       </p:par>
     </p:tnLst>
   </p:timing>
@@ -20981,7 +20552,7 @@
   <p:timing>
     <p:tnLst>
       <p:par>
-        <p:cTn xmlns:p14="http://schemas.microsoft.com/office/powerpoint/2010/main" id="1" dur="indefinite" restart="never" nodeType="tmRoot"/>
+        <p:cTn id="1" dur="indefinite" restart="never" nodeType="tmRoot"/>
       </p:par>
     </p:tnLst>
   </p:timing>
@@ -21176,7 +20747,6 @@
               <a:rPr lang="en-US" dirty="0" smtClean="0"/>
               <a:t>Changing Station</a:t>
             </a:r>
-            <a:endParaRPr lang="en-US" dirty="0" smtClean="0"/>
           </a:p>
           <a:p>
             <a:pPr marL="342900" lvl="1" indent="-342900">
@@ -21219,7 +20789,7 @@
   <p:timing>
     <p:tnLst>
       <p:par>
-        <p:cTn xmlns:p14="http://schemas.microsoft.com/office/powerpoint/2010/main" id="1" dur="indefinite" restart="never" nodeType="tmRoot"/>
+        <p:cTn id="1" dur="indefinite" restart="never" nodeType="tmRoot"/>
       </p:par>
     </p:tnLst>
   </p:timing>
@@ -21460,7 +21030,7 @@
   <p:timing>
     <p:tnLst>
       <p:par>
-        <p:cTn xmlns:p14="http://schemas.microsoft.com/office/powerpoint/2010/main" id="1" dur="indefinite" restart="never" nodeType="tmRoot">
+        <p:cTn id="1" dur="indefinite" restart="never" nodeType="tmRoot">
           <p:childTnLst>
             <p:seq concurrent="1" nextAc="seek">
               <p:cTn id="2" dur="indefinite" nodeType="mainSeq">
@@ -21751,7 +21321,7 @@
   <p:timing>
     <p:tnLst>
       <p:par>
-        <p:cTn xmlns:p14="http://schemas.microsoft.com/office/powerpoint/2010/main" id="1" dur="indefinite" restart="never" nodeType="tmRoot">
+        <p:cTn id="1" dur="indefinite" restart="never" nodeType="tmRoot">
           <p:childTnLst>
             <p:seq concurrent="1" nextAc="seek">
               <p:cTn id="2" dur="indefinite" nodeType="mainSeq">
@@ -22039,7 +21609,7 @@
   <p:timing>
     <p:tnLst>
       <p:par>
-        <p:cTn xmlns:p14="http://schemas.microsoft.com/office/powerpoint/2010/main" id="1" dur="indefinite" restart="never" nodeType="tmRoot"/>
+        <p:cTn id="1" dur="indefinite" restart="never" nodeType="tmRoot"/>
       </p:par>
     </p:tnLst>
   </p:timing>
@@ -22253,7 +21823,7 @@
   <p:timing>
     <p:tnLst>
       <p:par>
-        <p:cTn xmlns:p14="http://schemas.microsoft.com/office/powerpoint/2010/main" id="1" dur="indefinite" restart="never" nodeType="tmRoot"/>
+        <p:cTn id="1" dur="indefinite" restart="never" nodeType="tmRoot"/>
       </p:par>
     </p:tnLst>
   </p:timing>
@@ -22417,7 +21987,7 @@
   <p:timing>
     <p:tnLst>
       <p:par>
-        <p:cTn xmlns:p14="http://schemas.microsoft.com/office/powerpoint/2010/main" id="1" dur="indefinite" restart="never" nodeType="tmRoot"/>
+        <p:cTn id="1" dur="indefinite" restart="never" nodeType="tmRoot"/>
       </p:par>
     </p:tnLst>
   </p:timing>
@@ -22553,7 +22123,7 @@
   <p:timing>
     <p:tnLst>
       <p:par>
-        <p:cTn xmlns:p14="http://schemas.microsoft.com/office/powerpoint/2010/main" id="1" dur="indefinite" restart="never" nodeType="tmRoot"/>
+        <p:cTn id="1" dur="indefinite" restart="never" nodeType="tmRoot"/>
       </p:par>
     </p:tnLst>
   </p:timing>
@@ -22757,7 +22327,7 @@
   <p:timing>
     <p:tnLst>
       <p:par>
-        <p:cTn xmlns:p14="http://schemas.microsoft.com/office/powerpoint/2010/main" id="1" dur="indefinite" restart="never" nodeType="tmRoot"/>
+        <p:cTn id="1" dur="indefinite" restart="never" nodeType="tmRoot"/>
       </p:par>
     </p:tnLst>
   </p:timing>
@@ -23105,7 +22675,7 @@
   <p:timing>
     <p:tnLst>
       <p:par>
-        <p:cTn xmlns:p14="http://schemas.microsoft.com/office/powerpoint/2010/main" id="1" dur="indefinite" restart="never" nodeType="tmRoot"/>
+        <p:cTn id="1" dur="indefinite" restart="never" nodeType="tmRoot"/>
       </p:par>
     </p:tnLst>
   </p:timing>
@@ -23347,7 +22917,7 @@
   <p:timing>
     <p:tnLst>
       <p:par>
-        <p:cTn xmlns:p14="http://schemas.microsoft.com/office/powerpoint/2010/main" id="1" dur="indefinite" restart="never" nodeType="tmRoot">
+        <p:cTn id="1" dur="indefinite" restart="never" nodeType="tmRoot">
           <p:childTnLst>
             <p:seq concurrent="1" nextAc="seek">
               <p:cTn id="2" dur="indefinite" nodeType="mainSeq">
@@ -23585,7 +23155,7 @@
   <p:timing>
     <p:tnLst>
       <p:par>
-        <p:cTn xmlns:p14="http://schemas.microsoft.com/office/powerpoint/2010/main" id="1" dur="indefinite" restart="never" nodeType="tmRoot"/>
+        <p:cTn id="1" dur="indefinite" restart="never" nodeType="tmRoot"/>
       </p:par>
     </p:tnLst>
   </p:timing>
@@ -23721,7 +23291,7 @@
   <p:timing>
     <p:tnLst>
       <p:par>
-        <p:cTn xmlns:p14="http://schemas.microsoft.com/office/powerpoint/2010/main" id="1" dur="indefinite" restart="never" nodeType="tmRoot"/>
+        <p:cTn id="1" dur="indefinite" restart="never" nodeType="tmRoot"/>
       </p:par>
     </p:tnLst>
   </p:timing>
@@ -23813,15 +23383,7 @@
           <a:p>
             <a:r>
               <a:rPr lang="en-US" dirty="0" smtClean="0"/>
-              <a:t>Thank you</a:t>
-            </a:r>
-            <a:r>
-              <a:rPr lang="en-US" dirty="0" smtClean="0"/>
-              <a:t>!</a:t>
-            </a:r>
-            <a:r>
-              <a:rPr lang="en-US" dirty="0" smtClean="0"/>
-              <a:t/>
+              <a:t>Thank you!</a:t>
             </a:r>
             <a:br>
               <a:rPr lang="en-US" dirty="0" smtClean="0"/>
@@ -23832,11 +23394,7 @@
             </a:r>
             <a:r>
               <a:rPr lang="en-US" sz="1300" b="1" dirty="0" smtClean="0"/>
-              <a:t>  </a:t>
-            </a:r>
-            <a:r>
-              <a:rPr lang="en-US" sz="1300" b="1" dirty="0" smtClean="0"/>
-              <a:t>/  1.800.235.4091</a:t>
+              <a:t>  /  1.800.235.4091</a:t>
             </a:r>
             <a:endParaRPr lang="en-US" dirty="0"/>
           </a:p>
@@ -23867,7 +23425,7 @@
   <p:timing>
     <p:tnLst>
       <p:par>
-        <p:cTn xmlns:p14="http://schemas.microsoft.com/office/powerpoint/2010/main" id="1" dur="indefinite" restart="never" nodeType="tmRoot"/>
+        <p:cTn id="1" dur="indefinite" restart="never" nodeType="tmRoot"/>
       </p:par>
     </p:tnLst>
   </p:timing>
@@ -24035,7 +23593,7 @@
   <p:timing>
     <p:tnLst>
       <p:par>
-        <p:cTn xmlns:p14="http://schemas.microsoft.com/office/powerpoint/2010/main" id="1" dur="indefinite" restart="never" nodeType="tmRoot"/>
+        <p:cTn id="1" dur="indefinite" restart="never" nodeType="tmRoot"/>
       </p:par>
     </p:tnLst>
   </p:timing>
@@ -24250,7 +23808,6 @@
               <a:rPr lang="en-US" sz="2000" dirty="0"/>
               <a:t> is a good term for that blend.</a:t>
             </a:r>
-            <a:endParaRPr lang="en-US" sz="2000" dirty="0"/>
           </a:p>
         </p:txBody>
       </p:sp>
@@ -24362,7 +23919,7 @@
   <p:timing>
     <p:tnLst>
       <p:par>
-        <p:cTn xmlns:p14="http://schemas.microsoft.com/office/powerpoint/2010/main" id="1" dur="indefinite" restart="never" nodeType="tmRoot"/>
+        <p:cTn id="1" dur="indefinite" restart="never" nodeType="tmRoot"/>
       </p:par>
     </p:tnLst>
   </p:timing>
@@ -24632,7 +24189,6 @@
               <a:rPr lang="en-US" sz="2800" dirty="0" smtClean="0"/>
               <a:t> account</a:t>
             </a:r>
-            <a:endParaRPr lang="en-US" sz="2800" dirty="0" smtClean="0"/>
           </a:p>
         </p:txBody>
       </p:sp>
@@ -24661,7 +24217,7 @@
   <p:timing>
     <p:tnLst>
       <p:par>
-        <p:cTn xmlns:p14="http://schemas.microsoft.com/office/powerpoint/2010/main" id="1" dur="indefinite" restart="never" nodeType="tmRoot">
+        <p:cTn id="1" dur="indefinite" restart="never" nodeType="tmRoot">
           <p:childTnLst>
             <p:seq concurrent="1" nextAc="seek">
               <p:cTn id="2" dur="indefinite" nodeType="mainSeq">
@@ -25409,7 +24965,7 @@
   <p:timing>
     <p:tnLst>
       <p:par>
-        <p:cTn xmlns:p14="http://schemas.microsoft.com/office/powerpoint/2010/main" id="1" dur="indefinite" restart="never" nodeType="tmRoot"/>
+        <p:cTn id="1" dur="indefinite" restart="never" nodeType="tmRoot"/>
       </p:par>
     </p:tnLst>
   </p:timing>

</xml_diff>